<commit_message>
Modified day 2 slides
</commit_message>
<xml_diff>
--- a/kdb_training/KDB_2day_Training_Day2_students-kw.pptx
+++ b/kdb_training/KDB_2day_Training_Day2_students-kw.pptx
@@ -5,7 +5,7 @@
     <p:sldMasterId id="2147483660" r:id="rId1"/>
   </p:sldMasterIdLst>
   <p:notesMasterIdLst>
-    <p:notesMasterId r:id="rId57"/>
+    <p:notesMasterId r:id="rId58"/>
   </p:notesMasterIdLst>
   <p:sldIdLst>
     <p:sldId id="259" r:id="rId2"/>
@@ -60,9 +60,10 @@
     <p:sldId id="397" r:id="rId51"/>
     <p:sldId id="400" r:id="rId52"/>
     <p:sldId id="267" r:id="rId53"/>
-    <p:sldId id="426" r:id="rId54"/>
-    <p:sldId id="424" r:id="rId55"/>
-    <p:sldId id="427" r:id="rId56"/>
+    <p:sldId id="428" r:id="rId54"/>
+    <p:sldId id="426" r:id="rId55"/>
+    <p:sldId id="424" r:id="rId56"/>
+    <p:sldId id="427" r:id="rId57"/>
   </p:sldIdLst>
   <p:sldSz cx="9906000" cy="6858000" type="A4"/>
   <p:notesSz cx="6858000" cy="9144000"/>
@@ -262,7 +263,7 @@
           <a:p>
             <a:fld id="{5F442793-4807-406E-A5A0-45F6B68F233A}" type="datetimeFigureOut">
               <a:rPr lang="en-GB" smtClean="0"/>
-              <a:t>16/02/2019</a:t>
+              <a:t>18/02/2019</a:t>
             </a:fld>
             <a:endParaRPr lang="en-GB"/>
           </a:p>
@@ -3518,7 +3519,7 @@
           <a:p>
             <a:r>
               <a:rPr lang="en-US" dirty="0"/>
-              <a:t>Consider the following table: BD6_20170517.q</a:t>
+              <a:t>Consider the following table: trades</a:t>
             </a:r>
           </a:p>
           <a:p>
@@ -3538,14 +3539,22 @@
             </a:r>
             <a:r>
               <a:rPr lang="en-US" dirty="0"/>
-              <a:t> where the timestamp is between 9am and 9.30am. </a:t>
+              <a:t> where the time is between 2am and 2.05am. </a:t>
             </a:r>
             <a:endParaRPr lang="en-US" u="sng" dirty="0"/>
           </a:p>
           <a:p>
             <a:r>
               <a:rPr lang="en-US" dirty="0"/>
-              <a:t>Get the maximum price and the total size of trades for TA account ‘S009’</a:t>
+              <a:t>Get the maximum price and the total size of trades for </a:t>
+            </a:r>
+            <a:r>
+              <a:rPr lang="en-US" dirty="0" err="1"/>
+              <a:t>sym</a:t>
+            </a:r>
+            <a:r>
+              <a:rPr lang="en-US" dirty="0"/>
+              <a:t> ‘AAPL’</a:t>
             </a:r>
           </a:p>
         </p:txBody>
@@ -3633,7 +3642,7 @@
               <a:rPr lang="en-US" sz="1400" dirty="0">
                 <a:latin typeface="Courier (W1)" pitchFamily="49" charset="0"/>
               </a:rPr>
-              <a:t> `$("c:/q/training/BD6_20170517.q") </a:t>
+              <a:t> `$("c:/tmp/trade") </a:t>
             </a:r>
           </a:p>
           <a:p>
@@ -3709,7 +3718,7 @@
               <a:rPr lang="en-US" sz="1400" dirty="0">
                 <a:latin typeface="Courier (W1)" pitchFamily="49" charset="0"/>
               </a:rPr>
-              <a:t> from data where timestamp within (2017.05.17T09:00:00 2017.05.17T09:30:00)</a:t>
+              <a:t> from data where time within (02:00;02:05)</a:t>
             </a:r>
           </a:p>
           <a:p>
@@ -3741,7 +3750,19 @@
               <a:rPr lang="en-US" sz="1400" dirty="0">
                 <a:latin typeface="Courier (W1)" pitchFamily="49" charset="0"/>
               </a:rPr>
-              <a:t> quantity from data where TA like "S009"</a:t>
+              <a:t> quantity from data where </a:t>
+            </a:r>
+            <a:r>
+              <a:rPr lang="en-US" sz="1400" dirty="0" err="1">
+                <a:latin typeface="Courier (W1)" pitchFamily="49" charset="0"/>
+              </a:rPr>
+              <a:t>sym</a:t>
+            </a:r>
+            <a:r>
+              <a:rPr lang="en-US" sz="1400" dirty="0">
+                <a:latin typeface="Courier (W1)" pitchFamily="49" charset="0"/>
+              </a:rPr>
+              <a:t> = `AAPL</a:t>
             </a:r>
           </a:p>
         </p:txBody>
@@ -5974,7 +5995,7 @@
           <a:p>
             <a:r>
               <a:rPr lang="en-US" dirty="0"/>
-              <a:t>Consider the following table: BD6_20170517.q</a:t>
+              <a:t>Consider the following table: trade</a:t>
             </a:r>
           </a:p>
           <a:p>
@@ -5986,13 +6007,21 @@
           <a:p>
             <a:r>
               <a:rPr lang="en-US" dirty="0"/>
-              <a:t>Delete data before 9.05am </a:t>
-            </a:r>
-          </a:p>
-          <a:p>
-            <a:r>
-              <a:rPr lang="en-US" dirty="0"/>
-              <a:t>Change the trading account “S009” to “S010” (column: TA)</a:t>
+              <a:t>Delete data before 2.15am</a:t>
+            </a:r>
+          </a:p>
+          <a:p>
+            <a:r>
+              <a:rPr lang="en-US" dirty="0"/>
+              <a:t>Change all occurrences of </a:t>
+            </a:r>
+            <a:r>
+              <a:rPr lang="en-US" dirty="0" err="1"/>
+              <a:t>cond</a:t>
+            </a:r>
+            <a:r>
+              <a:rPr lang="en-US" dirty="0"/>
+              <a:t> ‘O’ to ‘A’</a:t>
             </a:r>
           </a:p>
         </p:txBody>
@@ -6080,7 +6109,7 @@
               <a:rPr lang="en-US" sz="1400" dirty="0">
                 <a:latin typeface="Courier (W1)" pitchFamily="49" charset="0"/>
               </a:rPr>
-              <a:t> `$("c:/q/training/BD6_20170517.q") </a:t>
+              <a:t> `$("c:/tmp/trades") </a:t>
             </a:r>
           </a:p>
           <a:p>
@@ -6096,7 +6125,7 @@
               <a:rPr lang="en-US" sz="1400" dirty="0">
                 <a:latin typeface="Courier (W1)" pitchFamily="49" charset="0"/>
               </a:rPr>
-              <a:t>q) delete from data where timestamp&lt;2017.05.17T09:05:00</a:t>
+              <a:t>q) delete from data where time&lt;02:15</a:t>
             </a:r>
           </a:p>
           <a:p>
@@ -6104,7 +6133,7 @@
               <a:rPr lang="en-US" sz="1400" dirty="0">
                 <a:latin typeface="Courier (W1)" pitchFamily="49" charset="0"/>
               </a:rPr>
-              <a:t>q) delete from `data where timestamp&lt;2017.05.17T09:05:00</a:t>
+              <a:t>q) delete from `data where time&lt;02:15</a:t>
             </a:r>
           </a:p>
           <a:p>
@@ -6112,7 +6141,31 @@
               <a:rPr lang="en-US" sz="1400" dirty="0">
                 <a:latin typeface="Courier (W1)" pitchFamily="49" charset="0"/>
               </a:rPr>
-              <a:t>q) update TA:`S010 from data where TA like "S009"</a:t>
+              <a:t>q) update </a:t>
+            </a:r>
+            <a:r>
+              <a:rPr lang="en-US" sz="1400" dirty="0" err="1">
+                <a:latin typeface="Courier (W1)" pitchFamily="49" charset="0"/>
+              </a:rPr>
+              <a:t>mode:`A</a:t>
+            </a:r>
+            <a:r>
+              <a:rPr lang="en-US" sz="1400" dirty="0">
+                <a:latin typeface="Courier (W1)" pitchFamily="49" charset="0"/>
+              </a:rPr>
+              <a:t> from data where </a:t>
+            </a:r>
+            <a:r>
+              <a:rPr lang="en-US" sz="1400" dirty="0" err="1">
+                <a:latin typeface="Courier (W1)" pitchFamily="49" charset="0"/>
+              </a:rPr>
+              <a:t>cond</a:t>
+            </a:r>
+            <a:r>
+              <a:rPr lang="en-US" sz="1400" dirty="0">
+                <a:latin typeface="Courier (W1)" pitchFamily="49" charset="0"/>
+              </a:rPr>
+              <a:t> = `O</a:t>
             </a:r>
           </a:p>
         </p:txBody>
@@ -6461,7 +6514,7 @@
           <a:p>
             <a:r>
               <a:rPr lang="en-US" dirty="0"/>
-              <a:t>The trades table: upload file BD6_20170517.csv</a:t>
+              <a:t>Consider the following table: trade</a:t>
             </a:r>
           </a:p>
           <a:p>
@@ -6484,13 +6537,13 @@
           <a:p>
             <a:r>
               <a:rPr lang="en-US" dirty="0"/>
-              <a:t>Select trades where the instrument group is 60</a:t>
-            </a:r>
-          </a:p>
-          <a:p>
-            <a:r>
-              <a:rPr lang="en-US" dirty="0"/>
-              <a:t>Select trades between 9 and 9.15am </a:t>
+              <a:t>Select trades where the stop is 1</a:t>
+            </a:r>
+          </a:p>
+          <a:p>
+            <a:r>
+              <a:rPr lang="en-US" dirty="0"/>
+              <a:t>Select trades between 2.14am and 2.16am</a:t>
             </a:r>
           </a:p>
           <a:p>
@@ -6504,7 +6557,7 @@
             </a:r>
             <a:r>
               <a:rPr lang="en-US" dirty="0"/>
-              <a:t>=83_160_50_0_229_14522_0. </a:t>
+              <a:t>=IBM</a:t>
             </a:r>
           </a:p>
           <a:p>
@@ -6548,7 +6601,7 @@
         <p:spPr>
           <a:xfrm>
             <a:off x="518913" y="3883015"/>
-            <a:ext cx="9046031" cy="2246769"/>
+            <a:ext cx="9046031" cy="1815882"/>
           </a:xfrm>
           <a:prstGeom prst="rect">
             <a:avLst/>
@@ -6595,7 +6648,7 @@
               <a:rPr lang="en-US" sz="1400" dirty="0">
                 <a:latin typeface="Courier (W1)" pitchFamily="49" charset="0"/>
               </a:rPr>
-              <a:t>count data</a:t>
+              <a:t>count trades</a:t>
             </a:r>
           </a:p>
           <a:p>
@@ -6606,7 +6659,7 @@
                 </a:solidFill>
                 <a:latin typeface="Courier (W1)" pitchFamily="49" charset="0"/>
               </a:rPr>
-              <a:t>q) select count i by </a:t>
+              <a:t>q) select count </a:t>
             </a:r>
             <a:r>
               <a:rPr lang="en-US" sz="1400" dirty="0" err="1">
@@ -6615,7 +6668,7 @@
                 </a:solidFill>
                 <a:latin typeface="Courier (W1)" pitchFamily="49" charset="0"/>
               </a:rPr>
-              <a:t>sym</a:t>
+              <a:t>i</a:t>
             </a:r>
             <a:r>
               <a:rPr lang="en-US" sz="1400" dirty="0">
@@ -6624,10 +6677,17 @@
                 </a:solidFill>
                 <a:latin typeface="Courier (W1)" pitchFamily="49" charset="0"/>
               </a:rPr>
-              <a:t> from data</a:t>
-            </a:r>
-          </a:p>
-          <a:p>
+              <a:t> by </a:t>
+            </a:r>
+            <a:r>
+              <a:rPr lang="en-US" sz="1400" dirty="0" err="1">
+                <a:solidFill>
+                  <a:schemeClr val="tx1"/>
+                </a:solidFill>
+                <a:latin typeface="Courier (W1)" pitchFamily="49" charset="0"/>
+              </a:rPr>
+              <a:t>sym</a:t>
+            </a:r>
             <a:r>
               <a:rPr lang="en-US" sz="1400" dirty="0">
                 <a:solidFill>
@@ -6635,7 +6695,67 @@
                 </a:solidFill>
                 <a:latin typeface="Courier (W1)" pitchFamily="49" charset="0"/>
               </a:rPr>
-              <a:t>q) select from data where </a:t>
+              <a:t> from </a:t>
+            </a:r>
+            <a:r>
+              <a:rPr lang="en-US" sz="1400" dirty="0">
+                <a:latin typeface="Courier (W1)" pitchFamily="49" charset="0"/>
+              </a:rPr>
+              <a:t>trades</a:t>
+            </a:r>
+            <a:endParaRPr lang="en-US" sz="1400" dirty="0">
+              <a:solidFill>
+                <a:schemeClr val="tx1"/>
+              </a:solidFill>
+              <a:latin typeface="Courier (W1)" pitchFamily="49" charset="0"/>
+            </a:endParaRPr>
+          </a:p>
+          <a:p>
+            <a:r>
+              <a:rPr lang="en-US" sz="1400" dirty="0">
+                <a:solidFill>
+                  <a:schemeClr val="tx1"/>
+                </a:solidFill>
+                <a:latin typeface="Courier (W1)" pitchFamily="49" charset="0"/>
+              </a:rPr>
+              <a:t>q) select from </a:t>
+            </a:r>
+            <a:r>
+              <a:rPr lang="en-US" sz="1400" dirty="0">
+                <a:latin typeface="Courier (W1)" pitchFamily="49" charset="0"/>
+              </a:rPr>
+              <a:t>trades</a:t>
+            </a:r>
+            <a:r>
+              <a:rPr lang="en-US" sz="1400" dirty="0">
+                <a:solidFill>
+                  <a:schemeClr val="tx1"/>
+                </a:solidFill>
+                <a:latin typeface="Courier (W1)" pitchFamily="49" charset="0"/>
+              </a:rPr>
+              <a:t> where stop=1</a:t>
+            </a:r>
+          </a:p>
+          <a:p>
+            <a:r>
+              <a:rPr lang="en-US" sz="1400" dirty="0">
+                <a:solidFill>
+                  <a:schemeClr val="tx1"/>
+                </a:solidFill>
+                <a:latin typeface="Courier (W1)" pitchFamily="49" charset="0"/>
+              </a:rPr>
+              <a:t>q) select from data where time within (02:14;02:16)</a:t>
+            </a:r>
+          </a:p>
+          <a:p>
+            <a:r>
+              <a:rPr lang="en-US" sz="1400" dirty="0">
+                <a:solidFill>
+                  <a:schemeClr val="tx1"/>
+                </a:solidFill>
+                <a:latin typeface="Courier (W1)" pitchFamily="49" charset="0"/>
+              </a:rPr>
+              <a:t>q) select </a:t>
             </a:r>
             <a:r>
               <a:rPr lang="en-US" sz="1400" dirty="0" err="1">
@@ -6644,7 +6764,7 @@
                 </a:solidFill>
                 <a:latin typeface="Courier (W1)" pitchFamily="49" charset="0"/>
               </a:rPr>
-              <a:t>instgroup</a:t>
+              <a:t>total:sum</a:t>
             </a:r>
             <a:r>
               <a:rPr lang="en-US" sz="1400" dirty="0">
@@ -6653,10 +6773,17 @@
                 </a:solidFill>
                 <a:latin typeface="Courier (W1)" pitchFamily="49" charset="0"/>
               </a:rPr>
-              <a:t>=60</a:t>
-            </a:r>
-          </a:p>
-          <a:p>
+              <a:t> quantity, </a:t>
+            </a:r>
+            <a:r>
+              <a:rPr lang="en-US" sz="1400" dirty="0" err="1">
+                <a:solidFill>
+                  <a:schemeClr val="tx1"/>
+                </a:solidFill>
+                <a:latin typeface="Courier (W1)" pitchFamily="49" charset="0"/>
+              </a:rPr>
+              <a:t>average:avg</a:t>
+            </a:r>
             <a:r>
               <a:rPr lang="en-US" sz="1400" dirty="0">
                 <a:solidFill>
@@ -6664,10 +6791,17 @@
                 </a:solidFill>
                 <a:latin typeface="Courier (W1)" pitchFamily="49" charset="0"/>
               </a:rPr>
-              <a:t>q) select from data where timestamp within (2017.05.17T09:00:00 2017.05.17T09:30:00)</a:t>
-            </a:r>
-          </a:p>
-          <a:p>
+              <a:t> quantity from data where </a:t>
+            </a:r>
+            <a:r>
+              <a:rPr lang="en-US" sz="1400" dirty="0" err="1">
+                <a:solidFill>
+                  <a:schemeClr val="tx1"/>
+                </a:solidFill>
+                <a:latin typeface="Courier (W1)" pitchFamily="49" charset="0"/>
+              </a:rPr>
+              <a:t>sym</a:t>
+            </a:r>
             <a:r>
               <a:rPr lang="en-US" sz="1400" dirty="0">
                 <a:solidFill>
@@ -6675,7 +6809,96 @@
                 </a:solidFill>
                 <a:latin typeface="Courier (W1)" pitchFamily="49" charset="0"/>
               </a:rPr>
-              <a:t>q) select </a:t>
+              <a:t>=`IBM</a:t>
+            </a:r>
+          </a:p>
+          <a:p>
+            <a:r>
+              <a:rPr lang="en-US" sz="1400" dirty="0">
+                <a:solidFill>
+                  <a:schemeClr val="tx1"/>
+                </a:solidFill>
+                <a:latin typeface="Courier (W1)" pitchFamily="49" charset="0"/>
+              </a:rPr>
+              <a:t>q) </a:t>
+            </a:r>
+            <a:r>
+              <a:rPr lang="en-US" sz="1400" dirty="0">
+                <a:latin typeface="Courier (W1)" pitchFamily="49" charset="0"/>
+              </a:rPr>
+              <a:t>select </a:t>
+            </a:r>
+            <a:r>
+              <a:rPr lang="en-US" sz="1400" dirty="0" err="1">
+                <a:latin typeface="Courier (W1)" pitchFamily="49" charset="0"/>
+              </a:rPr>
+              <a:t>high:max</a:t>
+            </a:r>
+            <a:r>
+              <a:rPr lang="en-US" sz="1400" dirty="0">
+                <a:latin typeface="Courier (W1)" pitchFamily="49" charset="0"/>
+              </a:rPr>
+              <a:t> </a:t>
+            </a:r>
+            <a:r>
+              <a:rPr lang="en-US" sz="1400" dirty="0" err="1">
+                <a:latin typeface="Courier (W1)" pitchFamily="49" charset="0"/>
+              </a:rPr>
+              <a:t>price,low:min</a:t>
+            </a:r>
+            <a:r>
+              <a:rPr lang="en-US" sz="1400" dirty="0">
+                <a:latin typeface="Courier (W1)" pitchFamily="49" charset="0"/>
+              </a:rPr>
+              <a:t> </a:t>
+            </a:r>
+            <a:r>
+              <a:rPr lang="en-US" sz="1400" dirty="0" err="1">
+                <a:latin typeface="Courier (W1)" pitchFamily="49" charset="0"/>
+              </a:rPr>
+              <a:t>price,open:first</a:t>
+            </a:r>
+            <a:r>
+              <a:rPr lang="en-US" sz="1400" dirty="0">
+                <a:latin typeface="Courier (W1)" pitchFamily="49" charset="0"/>
+              </a:rPr>
+              <a:t> </a:t>
+            </a:r>
+            <a:r>
+              <a:rPr lang="en-US" sz="1400" dirty="0" err="1">
+                <a:latin typeface="Courier (W1)" pitchFamily="49" charset="0"/>
+              </a:rPr>
+              <a:t>price,close:last</a:t>
+            </a:r>
+            <a:r>
+              <a:rPr lang="en-US" sz="1400" dirty="0">
+                <a:latin typeface="Courier (W1)" pitchFamily="49" charset="0"/>
+              </a:rPr>
+              <a:t> price by 5 </a:t>
+            </a:r>
+            <a:r>
+              <a:rPr lang="en-US" sz="1400" dirty="0" err="1">
+                <a:latin typeface="Courier (W1)" pitchFamily="49" charset="0"/>
+              </a:rPr>
+              <a:t>xbar</a:t>
+            </a:r>
+            <a:r>
+              <a:rPr lang="en-US" sz="1400" dirty="0">
+                <a:latin typeface="Courier (W1)" pitchFamily="49" charset="0"/>
+              </a:rPr>
+              <a:t> </a:t>
+            </a:r>
+            <a:r>
+              <a:rPr lang="en-US" sz="1400" dirty="0" err="1">
+                <a:latin typeface="Courier (W1)" pitchFamily="49" charset="0"/>
+              </a:rPr>
+              <a:t>time.minute</a:t>
+            </a:r>
+            <a:r>
+              <a:rPr lang="en-US" sz="1400" dirty="0">
+                <a:latin typeface="Courier (W1)" pitchFamily="49" charset="0"/>
+              </a:rPr>
+              <a:t> from data where </a:t>
             </a:r>
             <a:r>
               <a:rPr lang="en-US" sz="1400" dirty="0" err="1">
@@ -6684,7 +6907,7 @@
                 </a:solidFill>
                 <a:latin typeface="Courier (W1)" pitchFamily="49" charset="0"/>
               </a:rPr>
-              <a:t>total:sum</a:t>
+              <a:t>sym</a:t>
             </a:r>
             <a:r>
               <a:rPr lang="en-US" sz="1400" dirty="0">
@@ -6693,150 +6916,7 @@
                 </a:solidFill>
                 <a:latin typeface="Courier (W1)" pitchFamily="49" charset="0"/>
               </a:rPr>
-              <a:t> quantity, </a:t>
-            </a:r>
-            <a:r>
-              <a:rPr lang="en-US" sz="1400" dirty="0" err="1">
-                <a:solidFill>
-                  <a:schemeClr val="tx1"/>
-                </a:solidFill>
-                <a:latin typeface="Courier (W1)" pitchFamily="49" charset="0"/>
-              </a:rPr>
-              <a:t>average:avg</a:t>
-            </a:r>
-            <a:r>
-              <a:rPr lang="en-US" sz="1400" dirty="0">
-                <a:solidFill>
-                  <a:schemeClr val="tx1"/>
-                </a:solidFill>
-                <a:latin typeface="Courier (W1)" pitchFamily="49" charset="0"/>
-              </a:rPr>
-              <a:t> quantity from data where </a:t>
-            </a:r>
-            <a:r>
-              <a:rPr lang="en-US" sz="1400" dirty="0" err="1">
-                <a:solidFill>
-                  <a:schemeClr val="tx1"/>
-                </a:solidFill>
-                <a:latin typeface="Courier (W1)" pitchFamily="49" charset="0"/>
-              </a:rPr>
-              <a:t>sym</a:t>
-            </a:r>
-            <a:r>
-              <a:rPr lang="en-US" sz="1400" dirty="0">
-                <a:solidFill>
-                  <a:schemeClr val="tx1"/>
-                </a:solidFill>
-                <a:latin typeface="Courier (W1)" pitchFamily="49" charset="0"/>
-              </a:rPr>
-              <a:t>=`83_160_50_0_229_14522_0</a:t>
-            </a:r>
-          </a:p>
-          <a:p>
-            <a:r>
-              <a:rPr lang="en-US" sz="1400" dirty="0">
-                <a:solidFill>
-                  <a:schemeClr val="tx1"/>
-                </a:solidFill>
-                <a:latin typeface="Courier (W1)" pitchFamily="49" charset="0"/>
-              </a:rPr>
-              <a:t>q) </a:t>
-            </a:r>
-            <a:r>
-              <a:rPr lang="en-US" sz="1400" dirty="0">
-                <a:latin typeface="Courier (W1)" pitchFamily="49" charset="0"/>
-              </a:rPr>
-              <a:t>select </a:t>
-            </a:r>
-            <a:r>
-              <a:rPr lang="en-US" sz="1400" dirty="0" err="1">
-                <a:latin typeface="Courier (W1)" pitchFamily="49" charset="0"/>
-              </a:rPr>
-              <a:t>high:max</a:t>
-            </a:r>
-            <a:r>
-              <a:rPr lang="en-US" sz="1400" dirty="0">
-                <a:latin typeface="Courier (W1)" pitchFamily="49" charset="0"/>
-              </a:rPr>
-              <a:t> </a:t>
-            </a:r>
-            <a:r>
-              <a:rPr lang="en-US" sz="1400" dirty="0" err="1">
-                <a:latin typeface="Courier (W1)" pitchFamily="49" charset="0"/>
-              </a:rPr>
-              <a:t>price,low:min</a:t>
-            </a:r>
-            <a:r>
-              <a:rPr lang="en-US" sz="1400" dirty="0">
-                <a:latin typeface="Courier (W1)" pitchFamily="49" charset="0"/>
-              </a:rPr>
-              <a:t> </a:t>
-            </a:r>
-            <a:r>
-              <a:rPr lang="en-US" sz="1400" dirty="0" err="1">
-                <a:latin typeface="Courier (W1)" pitchFamily="49" charset="0"/>
-              </a:rPr>
-              <a:t>price,open:first</a:t>
-            </a:r>
-            <a:r>
-              <a:rPr lang="en-US" sz="1400" dirty="0">
-                <a:latin typeface="Courier (W1)" pitchFamily="49" charset="0"/>
-              </a:rPr>
-              <a:t> </a:t>
-            </a:r>
-            <a:r>
-              <a:rPr lang="en-US" sz="1400" dirty="0" err="1">
-                <a:latin typeface="Courier (W1)" pitchFamily="49" charset="0"/>
-              </a:rPr>
-              <a:t>price,close:last</a:t>
-            </a:r>
-            <a:r>
-              <a:rPr lang="en-US" sz="1400" dirty="0">
-                <a:latin typeface="Courier (W1)" pitchFamily="49" charset="0"/>
-              </a:rPr>
-              <a:t> price by 5 </a:t>
-            </a:r>
-            <a:r>
-              <a:rPr lang="en-US" sz="1400" dirty="0" err="1">
-                <a:latin typeface="Courier (W1)" pitchFamily="49" charset="0"/>
-              </a:rPr>
-              <a:t>xbar</a:t>
-            </a:r>
-            <a:r>
-              <a:rPr lang="en-US" sz="1400" dirty="0">
-                <a:latin typeface="Courier (W1)" pitchFamily="49" charset="0"/>
-              </a:rPr>
-              <a:t> </a:t>
-            </a:r>
-            <a:r>
-              <a:rPr lang="en-US" sz="1400" dirty="0" err="1">
-                <a:latin typeface="Courier (W1)" pitchFamily="49" charset="0"/>
-              </a:rPr>
-              <a:t>timestamp.minute</a:t>
-            </a:r>
-            <a:r>
-              <a:rPr lang="en-US" sz="1400" dirty="0">
-                <a:latin typeface="Courier (W1)" pitchFamily="49" charset="0"/>
-              </a:rPr>
-              <a:t> from data where </a:t>
-            </a:r>
-            <a:r>
-              <a:rPr lang="en-US" sz="1400" dirty="0" err="1">
-                <a:solidFill>
-                  <a:schemeClr val="tx1"/>
-                </a:solidFill>
-                <a:latin typeface="Courier (W1)" pitchFamily="49" charset="0"/>
-              </a:rPr>
-              <a:t>sym</a:t>
-            </a:r>
-            <a:r>
-              <a:rPr lang="en-US" sz="1400" dirty="0">
-                <a:solidFill>
-                  <a:schemeClr val="tx1"/>
-                </a:solidFill>
-                <a:latin typeface="Courier (W1)" pitchFamily="49" charset="0"/>
-              </a:rPr>
-              <a:t>=`83_160_50_0_229_14522_0</a:t>
+              <a:t>=`IBM</a:t>
             </a:r>
           </a:p>
         </p:txBody>
@@ -10579,7 +10659,7 @@
           <a:p>
             <a:r>
               <a:rPr lang="en-US" dirty="0"/>
-              <a:t>Load BD6_20170517.q</a:t>
+              <a:t>Load trade</a:t>
             </a:r>
           </a:p>
           <a:p>
@@ -10598,12 +10678,6 @@
             <a:r>
               <a:rPr lang="en-US" dirty="0"/>
               <a:t>Sort the prices within the trades table in ascending/descending order</a:t>
-            </a:r>
-          </a:p>
-          <a:p>
-            <a:r>
-              <a:rPr lang="en-US" dirty="0"/>
-              <a:t>Meta on the sorted table -&gt; what do you notice</a:t>
             </a:r>
           </a:p>
           <a:p>
@@ -10658,7 +10732,7 @@
         <p:spPr>
           <a:xfrm>
             <a:off x="529163" y="3528520"/>
-            <a:ext cx="8885767" cy="2031325"/>
+            <a:ext cx="8885767" cy="1815882"/>
           </a:xfrm>
           <a:prstGeom prst="rect">
             <a:avLst/>
@@ -10708,7 +10782,7 @@
               <a:rPr lang="en-US" sz="1400" dirty="0">
                 <a:latin typeface="Courier (W1)" pitchFamily="49" charset="0"/>
               </a:rPr>
-              <a:t> `$("c:/q/training/BD6_20170517.q") </a:t>
+              <a:t> `$("c:/tmp/trade") </a:t>
             </a:r>
           </a:p>
           <a:p>
@@ -10773,26 +10847,6 @@
                 <a:latin typeface="Courier (W1)" pitchFamily="49" charset="0"/>
               </a:rPr>
               <a:t>q) `price </a:t>
-            </a:r>
-            <a:r>
-              <a:rPr lang="en-US" sz="1400" dirty="0" err="1">
-                <a:latin typeface="Courier (W1)" pitchFamily="49" charset="0"/>
-              </a:rPr>
-              <a:t>xdesc</a:t>
-            </a:r>
-            <a:r>
-              <a:rPr lang="en-US" sz="1400" dirty="0">
-                <a:latin typeface="Courier (W1)" pitchFamily="49" charset="0"/>
-              </a:rPr>
-              <a:t> data</a:t>
-            </a:r>
-          </a:p>
-          <a:p>
-            <a:r>
-              <a:rPr lang="en-US" sz="1400" dirty="0">
-                <a:latin typeface="Courier (W1)" pitchFamily="49" charset="0"/>
-              </a:rPr>
-              <a:t>q) meta `price </a:t>
             </a:r>
             <a:r>
               <a:rPr lang="en-US" sz="1400" dirty="0" err="1">
@@ -12176,13 +12230,13 @@
           <a:p>
             <a:r>
               <a:rPr lang="en-US" dirty="0"/>
-              <a:t>Load table BD6_20170517.q</a:t>
-            </a:r>
-          </a:p>
-          <a:p>
-            <a:r>
-              <a:rPr lang="en-US" dirty="0"/>
-              <a:t>Build 2 tables T1 and T2. T1 contains timestamp and </a:t>
+              <a:t>Load trade</a:t>
+            </a:r>
+          </a:p>
+          <a:p>
+            <a:r>
+              <a:rPr lang="en-US" dirty="0"/>
+              <a:t>Build 2 tables T1 and T2. T1 contains time and </a:t>
             </a:r>
             <a:r>
               <a:rPr lang="en-US" dirty="0" err="1"/>
@@ -12190,7 +12244,7 @@
             </a:r>
             <a:r>
               <a:rPr lang="en-US" dirty="0"/>
-              <a:t> from the trades tables. T2 contains the price and volume (quantity) from the trades table</a:t>
+              <a:t> from the trades tables. T2 contains the price and size from the trades table</a:t>
             </a:r>
           </a:p>
           <a:p>
@@ -12282,7 +12336,7 @@
               <a:rPr lang="en-US" sz="1200" dirty="0" err="1">
                 <a:latin typeface="Courier (W1)" pitchFamily="49" charset="0"/>
               </a:rPr>
-              <a:t>timestamp,sym</a:t>
+              <a:t>time,sym</a:t>
             </a:r>
             <a:r>
               <a:rPr lang="en-US" sz="1200" dirty="0">
@@ -12715,19 +12769,13 @@
           <a:p>
             <a:r>
               <a:rPr lang="en-US" dirty="0"/>
-              <a:t>Load table BD6_20170517.q</a:t>
-            </a:r>
-          </a:p>
-          <a:p>
-            <a:r>
-              <a:rPr lang="en-US" dirty="0"/>
-              <a:t>Build a first table T1 with timestamp, sym, price, quantity for sym 83_153_50_0_202_14540_0 and 83_153_50_0_202_14577_0</a:t>
-            </a:r>
-          </a:p>
-          <a:p>
-            <a:r>
-              <a:rPr lang="en-US" dirty="0"/>
-              <a:t>Build a second table with 2 columns: </a:t>
+              <a:t>Load table trade</a:t>
+            </a:r>
+          </a:p>
+          <a:p>
+            <a:r>
+              <a:rPr lang="en-US" dirty="0"/>
+              <a:t>Build a first table T1 with time, sym, price, quantity for </a:t>
             </a:r>
             <a:r>
               <a:rPr lang="en-US" dirty="0" err="1"/>
@@ -12735,7 +12783,21 @@
             </a:r>
             <a:r>
               <a:rPr lang="en-US" dirty="0"/>
-              <a:t> and series. For 83_153_50_0_202_14540_0, the series should be NKM17. For 83_153_50_0_202_14577_0, the series should be NKN17. </a:t>
+              <a:t> AAPL and MSFT</a:t>
+            </a:r>
+          </a:p>
+          <a:p>
+            <a:r>
+              <a:rPr lang="en-US" dirty="0"/>
+              <a:t>Build a second table with 2 columns: </a:t>
+            </a:r>
+            <a:r>
+              <a:rPr lang="en-US" dirty="0" err="1"/>
+              <a:t>sym</a:t>
+            </a:r>
+            <a:r>
+              <a:rPr lang="en-US" dirty="0"/>
+              <a:t> and series. For AAPL, the Company name should be Apple. For MSFT, the Company name should be Microsoft. </a:t>
             </a:r>
           </a:p>
           <a:p>
@@ -12818,7 +12880,7 @@
               <a:rPr lang="en-US" sz="1200" dirty="0">
                 <a:latin typeface="Courier (W1)" pitchFamily="49" charset="0"/>
               </a:rPr>
-              <a:t>q) trade1: select timestamp, </a:t>
+              <a:t>q) trade1: select time, </a:t>
             </a:r>
             <a:r>
               <a:rPr lang="en-US" sz="1200" dirty="0" err="1">
@@ -12854,7 +12916,7 @@
               <a:rPr lang="en-US" sz="1200" dirty="0">
                 <a:latin typeface="Courier (W1)" pitchFamily="49" charset="0"/>
               </a:rPr>
-              <a:t> in (`83_153_50_0_202_14540_0,`83_153_50_0_202_14577_0)</a:t>
+              <a:t> in (`AAPL;`MSFT)</a:t>
             </a:r>
           </a:p>
           <a:p>
@@ -12874,7 +12936,31 @@
               <a:rPr lang="en-US" sz="1200" dirty="0">
                 <a:latin typeface="Courier (W1)" pitchFamily="49" charset="0"/>
               </a:rPr>
-              <a:t>: ([] sym:`83_153_50_0_202_14540_0`83_153_50_0_202_14577_0; series:`NKM17`NKN17)</a:t>
+              <a:t>: ([] </a:t>
+            </a:r>
+            <a:r>
+              <a:rPr lang="en-US" sz="1200" dirty="0" err="1">
+                <a:latin typeface="Courier (W1)" pitchFamily="49" charset="0"/>
+              </a:rPr>
+              <a:t>sym</a:t>
+            </a:r>
+            <a:r>
+              <a:rPr lang="en-US" sz="1200" dirty="0">
+                <a:latin typeface="Courier (W1)" pitchFamily="49" charset="0"/>
+              </a:rPr>
+              <a:t>:`AAPL`MSFT; companyname:`</a:t>
+            </a:r>
+            <a:r>
+              <a:rPr lang="en-US" sz="1200" dirty="0" err="1">
+                <a:latin typeface="Courier (W1)" pitchFamily="49" charset="0"/>
+              </a:rPr>
+              <a:t>Apple`Microsoft</a:t>
+            </a:r>
+            <a:r>
+              <a:rPr lang="en-US" sz="1200" dirty="0">
+                <a:latin typeface="Courier (W1)" pitchFamily="49" charset="0"/>
+              </a:rPr>
+              <a:t>)</a:t>
             </a:r>
           </a:p>
           <a:p>
@@ -13252,7 +13338,7 @@
             </a:r>
             <a:r>
               <a:rPr lang="en-US" dirty="0"/>
-              <a:t> where timestamp between 9 and 9.30am</a:t>
+              <a:t> where time between 2.00am and 2.10am</a:t>
             </a:r>
           </a:p>
           <a:p>
@@ -13266,7 +13352,7 @@
             </a:r>
             <a:r>
               <a:rPr lang="en-US" dirty="0"/>
-              <a:t> where timestamp between 9.30 and 10am</a:t>
+              <a:t> where time between 2.10am and 2.15am</a:t>
             </a:r>
           </a:p>
           <a:p>
@@ -13313,7 +13399,7 @@
         <p:spPr>
           <a:xfrm>
             <a:off x="451754" y="3703881"/>
-            <a:ext cx="8997045" cy="1200329"/>
+            <a:ext cx="8997045" cy="830997"/>
           </a:xfrm>
           <a:prstGeom prst="rect">
             <a:avLst/>
@@ -13375,7 +13461,7 @@
               <a:rPr lang="en-US" sz="1200" dirty="0">
                 <a:latin typeface="Courier (W1)" pitchFamily="49" charset="0"/>
               </a:rPr>
-              <a:t> from data where timestamp within (2017.05.17T09:00:00 2017.05.17T09:30:00)</a:t>
+              <a:t> from data where time within (02:00;02.10)</a:t>
             </a:r>
           </a:p>
           <a:p>
@@ -13407,7 +13493,7 @@
               <a:rPr lang="en-US" sz="1200" dirty="0">
                 <a:latin typeface="Courier (W1)" pitchFamily="49" charset="0"/>
               </a:rPr>
-              <a:t> from data where timestamp within (2017.05.17T09:30:00 2017.05.17T10:00:00)</a:t>
+              <a:t> from data where time within (02.:10;02.15)</a:t>
             </a:r>
           </a:p>
           <a:p>
@@ -14176,13 +14262,21 @@
           <a:p>
             <a:r>
               <a:rPr lang="en-US" dirty="0"/>
-              <a:t>Load table BD6_20170517.q</a:t>
-            </a:r>
-          </a:p>
-          <a:p>
-            <a:r>
-              <a:rPr lang="en-US" dirty="0"/>
-              <a:t>Build a table with 2 columns: </a:t>
+              <a:t>Load table trade</a:t>
+            </a:r>
+          </a:p>
+          <a:p>
+            <a:r>
+              <a:rPr lang="en-US" dirty="0"/>
+              <a:t>Build a table </a:t>
+            </a:r>
+            <a:r>
+              <a:rPr lang="en-US" dirty="0" err="1"/>
+              <a:t>seriesinfo</a:t>
+            </a:r>
+            <a:r>
+              <a:rPr lang="en-US" dirty="0"/>
+              <a:t> with 2 columns: </a:t>
             </a:r>
             <a:r>
               <a:rPr lang="en-US" dirty="0" err="1"/>
@@ -14190,7 +14284,7 @@
             </a:r>
             <a:r>
               <a:rPr lang="en-US" dirty="0"/>
-              <a:t> and series. For 83_153_50_0_202_14540_0, the series should be NKM17. For 83_153_50_0_202_14577_0, the series should be NKN17. </a:t>
+              <a:t> and series for AAPL and MSFT,</a:t>
             </a:r>
           </a:p>
           <a:p>
@@ -14267,7 +14361,31 @@
               <a:rPr lang="en-US" sz="1200" dirty="0">
                 <a:latin typeface="Courier (W1)" pitchFamily="49" charset="0"/>
               </a:rPr>
-              <a:t>: ([] sym:`83_153_50_0_202_14540_0`83_153_50_0_202_14577_0; series:`NKM17`NKN17)</a:t>
+              <a:t>: ([] </a:t>
+            </a:r>
+            <a:r>
+              <a:rPr lang="en-US" sz="1200" dirty="0" err="1">
+                <a:latin typeface="Courier (W1)" pitchFamily="49" charset="0"/>
+              </a:rPr>
+              <a:t>sym</a:t>
+            </a:r>
+            <a:r>
+              <a:rPr lang="en-US" sz="1200" dirty="0">
+                <a:latin typeface="Courier (W1)" pitchFamily="49" charset="0"/>
+              </a:rPr>
+              <a:t>:`AAPL`MSFT; company:`</a:t>
+            </a:r>
+            <a:r>
+              <a:rPr lang="en-US" sz="1200" dirty="0" err="1">
+                <a:latin typeface="Courier (W1)" pitchFamily="49" charset="0"/>
+              </a:rPr>
+              <a:t>Apple`Microsoft</a:t>
+            </a:r>
+            <a:r>
+              <a:rPr lang="en-US" sz="1200" dirty="0">
+                <a:latin typeface="Courier (W1)" pitchFamily="49" charset="0"/>
+              </a:rPr>
+              <a:t>)</a:t>
             </a:r>
           </a:p>
           <a:p>
@@ -14328,7 +14446,7 @@
               <a:rPr lang="en-US" sz="1200" dirty="0">
                 <a:latin typeface="Courier (W1)" pitchFamily="49" charset="0"/>
               </a:rPr>
-              <a:t>q) t1:select timestamp, </a:t>
+              <a:t>q) t1:select time, </a:t>
             </a:r>
             <a:r>
               <a:rPr lang="en-US" sz="1200" dirty="0" err="1">
@@ -14364,7 +14482,7 @@
               <a:rPr lang="en-US" sz="1200" dirty="0">
                 <a:latin typeface="Courier (W1)" pitchFamily="49" charset="0"/>
               </a:rPr>
-              <a:t> in (`83_153_50_0_202_14540_0,`83_153_50_0_202_14577_0)</a:t>
+              <a:t> in `AAPL`MSFT</a:t>
             </a:r>
           </a:p>
           <a:p>
@@ -15016,13 +15134,13 @@
           <a:p>
             <a:r>
               <a:rPr lang="en-US" dirty="0"/>
-              <a:t>Load table BD6_20170517.q</a:t>
-            </a:r>
-          </a:p>
-          <a:p>
-            <a:r>
-              <a:rPr lang="en-US" dirty="0"/>
-              <a:t>Create a1 using the top 10 rows of data with columns timestamp, price, </a:t>
+              <a:t>Load table trade</a:t>
+            </a:r>
+          </a:p>
+          <a:p>
+            <a:r>
+              <a:rPr lang="en-US" dirty="0"/>
+              <a:t>Create a1 using the top 10 rows of data with columns time, price, </a:t>
             </a:r>
             <a:r>
               <a:rPr lang="en-US" dirty="0" err="1"/>
@@ -15033,7 +15151,7 @@
           <a:p>
             <a:r>
               <a:rPr lang="en-US" dirty="0"/>
-              <a:t>Create a2 using the bottom 10 rows of data with columns timestamp, price, </a:t>
+              <a:t>Create a2 using the bottom 10 rows of data with columns time, price, </a:t>
             </a:r>
             <a:r>
               <a:rPr lang="en-US" dirty="0" err="1"/>
@@ -15041,7 +15159,7 @@
             </a:r>
             <a:r>
               <a:rPr lang="en-US" dirty="0"/>
-              <a:t>, volume (quantity)</a:t>
+              <a:t>, size</a:t>
             </a:r>
           </a:p>
           <a:p>
@@ -15127,7 +15245,7 @@
               <a:rPr lang="en-US" sz="1200" dirty="0">
                 <a:latin typeface="Courier (W1)" pitchFamily="49" charset="0"/>
               </a:rPr>
-              <a:t>q) a1: 10#select timestamp, </a:t>
+              <a:t>q) a1: 10#select time, </a:t>
             </a:r>
             <a:r>
               <a:rPr lang="en-US" sz="1200" dirty="0" err="1">
@@ -15147,7 +15265,7 @@
               <a:rPr lang="en-US" sz="1200" dirty="0">
                 <a:latin typeface="Courier (W1)" pitchFamily="49" charset="0"/>
               </a:rPr>
-              <a:t>q) a2: -10#select timestamp, </a:t>
+              <a:t>q) a2: -10#select time, </a:t>
             </a:r>
             <a:r>
               <a:rPr lang="en-US" sz="1200" dirty="0" err="1">
@@ -16307,29 +16425,13 @@
           <a:p>
             <a:r>
               <a:rPr lang="en-US" dirty="0"/>
-              <a:t>Create a “trade” table with 3 columns – timestamp, sym, </a:t>
-            </a:r>
-            <a:r>
-              <a:rPr lang="en-US" dirty="0" err="1"/>
-              <a:t>qty</a:t>
-            </a:r>
-            <a:endParaRPr lang="en-US" dirty="0"/>
-          </a:p>
-          <a:p>
-            <a:r>
-              <a:rPr lang="en-US" dirty="0"/>
-              <a:t>Create a “quote” table with 3 columns – timestamp, sym, </a:t>
-            </a:r>
-            <a:r>
-              <a:rPr lang="en-US" dirty="0" err="1"/>
-              <a:t>px</a:t>
-            </a:r>
-            <a:endParaRPr lang="en-US" dirty="0"/>
-          </a:p>
-          <a:p>
-            <a:r>
-              <a:rPr lang="en-US" dirty="0"/>
-              <a:t>Both tables should have 100,000 rows</a:t>
+              <a:t>Create a “trade” table with 3 columns – , sym, qty</a:t>
+            </a:r>
+          </a:p>
+          <a:p>
+            <a:r>
+              <a:rPr lang="en-US" dirty="0"/>
+              <a:t>Create a “quote” table with 3 columns – time, sym, px</a:t>
             </a:r>
           </a:p>
           <a:p>
@@ -16416,27 +16518,39 @@
               <a:rPr lang="en-US" sz="1200" dirty="0">
                 <a:latin typeface="Courier (W1)" pitchFamily="49" charset="0"/>
               </a:rPr>
-              <a:t>q) n:10000</a:t>
-            </a:r>
-          </a:p>
-          <a:p>
+              <a:t>q) trade: get </a:t>
+            </a:r>
+            <a:r>
+              <a:rPr lang="en-US" sz="1200" dirty="0" err="1">
+                <a:latin typeface="Courier (W1)" pitchFamily="49" charset="0"/>
+              </a:rPr>
+              <a:t>hsym</a:t>
+            </a:r>
             <a:r>
               <a:rPr lang="en-US" sz="1200" dirty="0">
                 <a:latin typeface="Courier (W1)" pitchFamily="49" charset="0"/>
               </a:rPr>
-              <a:t>q) trade:([]</a:t>
+              <a:t> `$("c:/tmp/trade") </a:t>
+            </a:r>
+          </a:p>
+          <a:p>
+            <a:r>
+              <a:rPr lang="en-US" sz="1200" dirty="0">
+                <a:latin typeface="Courier (W1)" pitchFamily="49" charset="0"/>
+              </a:rPr>
+              <a:t>q) quote: get </a:t>
             </a:r>
             <a:r>
               <a:rPr lang="en-US" sz="1200" dirty="0" err="1">
                 <a:latin typeface="Courier (W1)" pitchFamily="49" charset="0"/>
               </a:rPr>
-              <a:t>timestamp:asc</a:t>
+              <a:t>hsym</a:t>
             </a:r>
             <a:r>
               <a:rPr lang="en-US" sz="1200" dirty="0">
                 <a:latin typeface="Courier (W1)" pitchFamily="49" charset="0"/>
               </a:rPr>
-              <a:t> n?00:00:00.000;sym:n?`msft`ibm`ge`c`goog`aapl`nflx`bac;qty:n?500)</a:t>
+              <a:t> `$("c:/tmp/quote") </a:t>
             </a:r>
           </a:p>
           <a:p>
@@ -16444,26 +16558,70 @@
               <a:rPr lang="en-US" sz="1200" dirty="0">
                 <a:latin typeface="Courier (W1)" pitchFamily="49" charset="0"/>
               </a:rPr>
-              <a:t>q) quote:([]</a:t>
+              <a:t>q) \</a:t>
             </a:r>
             <a:r>
               <a:rPr lang="en-US" sz="1200" dirty="0" err="1">
                 <a:latin typeface="Courier (W1)" pitchFamily="49" charset="0"/>
               </a:rPr>
-              <a:t>timestamp:asc</a:t>
+              <a:t>ts</a:t>
             </a:r>
             <a:r>
               <a:rPr lang="en-US" sz="1200" dirty="0">
                 <a:latin typeface="Courier (W1)" pitchFamily="49" charset="0"/>
               </a:rPr>
-              <a:t> n?00:00:00.000;sym:n?`msft`ibm`ge`c`goog`aapl`nflx`bac;px:n?1000f)</a:t>
-            </a:r>
-          </a:p>
-          <a:p>
+              <a:t> </a:t>
+            </a:r>
+            <a:r>
+              <a:rPr lang="en-US" sz="1200" dirty="0" err="1">
+                <a:latin typeface="Courier (W1)" pitchFamily="49" charset="0"/>
+              </a:rPr>
+              <a:t>aj</a:t>
+            </a:r>
             <a:r>
               <a:rPr lang="en-US" sz="1200" dirty="0">
                 <a:latin typeface="Courier (W1)" pitchFamily="49" charset="0"/>
               </a:rPr>
+              <a:t>[`</a:t>
+            </a:r>
+            <a:r>
+              <a:rPr lang="en-US" sz="1200" dirty="0" err="1">
+                <a:latin typeface="Courier (W1)" pitchFamily="49" charset="0"/>
+              </a:rPr>
+              <a:t>sym`time;trade;quote</a:t>
+            </a:r>
+            <a:r>
+              <a:rPr lang="en-US" sz="1200" dirty="0">
+                <a:latin typeface="Courier (W1)" pitchFamily="49" charset="0"/>
+              </a:rPr>
+              <a:t>]</a:t>
+            </a:r>
+          </a:p>
+          <a:p>
+            <a:r>
+              <a:rPr lang="en-US" sz="1200" dirty="0">
+                <a:latin typeface="Courier (W1)" pitchFamily="49" charset="0"/>
+              </a:rPr>
+              <a:t>q) update `</a:t>
+            </a:r>
+            <a:r>
+              <a:rPr lang="en-US" sz="1200" dirty="0" err="1">
+                <a:latin typeface="Courier (W1)" pitchFamily="49" charset="0"/>
+              </a:rPr>
+              <a:t>g#sym</a:t>
+            </a:r>
+            <a:r>
+              <a:rPr lang="en-US" sz="1200" dirty="0">
+                <a:latin typeface="Courier (W1)" pitchFamily="49" charset="0"/>
+              </a:rPr>
+              <a:t> from `quote</a:t>
+            </a:r>
+          </a:p>
+          <a:p>
+            <a:r>
+              <a:rPr lang="en-US" sz="1200" dirty="0">
+                <a:latin typeface="Courier (W1)" pitchFamily="49" charset="0"/>
+              </a:rPr>
               <a:t>q) \</a:t>
             </a:r>
             <a:r>
@@ -16494,71 +16652,7 @@
               <a:rPr lang="en-US" sz="1200" dirty="0" err="1">
                 <a:latin typeface="Courier (W1)" pitchFamily="49" charset="0"/>
               </a:rPr>
-              <a:t>sym`timestamp;trade;quote</a:t>
-            </a:r>
-            <a:r>
-              <a:rPr lang="en-US" sz="1200" dirty="0">
-                <a:latin typeface="Courier (W1)" pitchFamily="49" charset="0"/>
-              </a:rPr>
-              <a:t>]</a:t>
-            </a:r>
-          </a:p>
-          <a:p>
-            <a:r>
-              <a:rPr lang="en-US" sz="1200" dirty="0">
-                <a:latin typeface="Courier (W1)" pitchFamily="49" charset="0"/>
-              </a:rPr>
-              <a:t>q) update `</a:t>
-            </a:r>
-            <a:r>
-              <a:rPr lang="en-US" sz="1200" dirty="0" err="1">
-                <a:latin typeface="Courier (W1)" pitchFamily="49" charset="0"/>
-              </a:rPr>
-              <a:t>g#sym</a:t>
-            </a:r>
-            <a:r>
-              <a:rPr lang="en-US" sz="1200" dirty="0">
-                <a:latin typeface="Courier (W1)" pitchFamily="49" charset="0"/>
-              </a:rPr>
-              <a:t> from `quote</a:t>
-            </a:r>
-          </a:p>
-          <a:p>
-            <a:r>
-              <a:rPr lang="en-US" sz="1200" dirty="0">
-                <a:latin typeface="Courier (W1)" pitchFamily="49" charset="0"/>
-              </a:rPr>
-              <a:t>q) \</a:t>
-            </a:r>
-            <a:r>
-              <a:rPr lang="en-US" sz="1200" dirty="0" err="1">
-                <a:latin typeface="Courier (W1)" pitchFamily="49" charset="0"/>
-              </a:rPr>
-              <a:t>ts</a:t>
-            </a:r>
-            <a:r>
-              <a:rPr lang="en-US" sz="1200" dirty="0">
-                <a:latin typeface="Courier (W1)" pitchFamily="49" charset="0"/>
-              </a:rPr>
-              <a:t> </a:t>
-            </a:r>
-            <a:r>
-              <a:rPr lang="en-US" sz="1200" dirty="0" err="1">
-                <a:latin typeface="Courier (W1)" pitchFamily="49" charset="0"/>
-              </a:rPr>
-              <a:t>aj</a:t>
-            </a:r>
-            <a:r>
-              <a:rPr lang="en-US" sz="1200" dirty="0">
-                <a:latin typeface="Courier (W1)" pitchFamily="49" charset="0"/>
-              </a:rPr>
-              <a:t>[`</a:t>
-            </a:r>
-            <a:r>
-              <a:rPr lang="en-US" sz="1200" dirty="0" err="1">
-                <a:latin typeface="Courier (W1)" pitchFamily="49" charset="0"/>
-              </a:rPr>
-              <a:t>sym`timestamp;trade;quote</a:t>
+              <a:t>sym`time;trade;quote</a:t>
             </a:r>
             <a:r>
               <a:rPr lang="en-US" sz="1200" dirty="0">
@@ -18708,6 +18802,268 @@
       </p:grpSpPr>
       <p:sp>
         <p:nvSpPr>
+          <p:cNvPr id="2" name="Title 1">
+            <a:extLst>
+              <a:ext uri="{FF2B5EF4-FFF2-40B4-BE49-F238E27FC236}">
+                <a16:creationId xmlns:a16="http://schemas.microsoft.com/office/drawing/2014/main" id="{FA4CC624-2896-413A-9491-EB35F0B22480}"/>
+              </a:ext>
+            </a:extLst>
+          </p:cNvPr>
+          <p:cNvSpPr>
+            <a:spLocks noGrp="1"/>
+          </p:cNvSpPr>
+          <p:nvPr>
+            <p:ph type="title"/>
+          </p:nvPr>
+        </p:nvSpPr>
+        <p:spPr/>
+        <p:txBody>
+          <a:bodyPr/>
+          <a:lstStyle/>
+          <a:p>
+            <a:r>
+              <a:rPr lang="en-SG" dirty="0" err="1"/>
+              <a:t>kdb</a:t>
+            </a:r>
+            <a:r>
+              <a:rPr lang="en-SG" dirty="0"/>
+              <a:t> Process Types</a:t>
+            </a:r>
+          </a:p>
+        </p:txBody>
+      </p:sp>
+      <p:sp>
+        <p:nvSpPr>
+          <p:cNvPr id="3" name="Content Placeholder 2">
+            <a:extLst>
+              <a:ext uri="{FF2B5EF4-FFF2-40B4-BE49-F238E27FC236}">
+                <a16:creationId xmlns:a16="http://schemas.microsoft.com/office/drawing/2014/main" id="{E088A293-84F4-47EB-970F-C00D04FEEAC6}"/>
+              </a:ext>
+            </a:extLst>
+          </p:cNvPr>
+          <p:cNvSpPr>
+            <a:spLocks noGrp="1"/>
+          </p:cNvSpPr>
+          <p:nvPr>
+            <p:ph idx="1"/>
+          </p:nvPr>
+        </p:nvSpPr>
+        <p:spPr/>
+        <p:txBody>
+          <a:bodyPr>
+            <a:normAutofit/>
+          </a:bodyPr>
+          <a:lstStyle/>
+          <a:p>
+            <a:r>
+              <a:rPr lang="en-SG" dirty="0" err="1"/>
+              <a:t>Tickerplant</a:t>
+            </a:r>
+            <a:r>
+              <a:rPr lang="en-SG" dirty="0"/>
+              <a:t> (TP)</a:t>
+            </a:r>
+          </a:p>
+          <a:p>
+            <a:pPr lvl="1"/>
+            <a:r>
+              <a:rPr lang="en-SG" dirty="0"/>
+              <a:t>Receives and republish data</a:t>
+            </a:r>
+          </a:p>
+          <a:p>
+            <a:pPr lvl="1"/>
+            <a:r>
+              <a:rPr lang="en-SG" dirty="0"/>
+              <a:t>Saves data into </a:t>
+            </a:r>
+            <a:r>
+              <a:rPr lang="en-SG" dirty="0" err="1"/>
+              <a:t>tplog</a:t>
+            </a:r>
+            <a:r>
+              <a:rPr lang="en-SG" dirty="0"/>
+              <a:t> file</a:t>
+            </a:r>
+          </a:p>
+          <a:p>
+            <a:endParaRPr lang="en-SG" dirty="0"/>
+          </a:p>
+          <a:p>
+            <a:r>
+              <a:rPr lang="en-SG" dirty="0"/>
+              <a:t>Realtime Database (RDB)</a:t>
+            </a:r>
+          </a:p>
+          <a:p>
+            <a:pPr lvl="1"/>
+            <a:r>
+              <a:rPr lang="en-SG" dirty="0"/>
+              <a:t>Receives data from TP</a:t>
+            </a:r>
+          </a:p>
+          <a:p>
+            <a:pPr lvl="1"/>
+            <a:r>
+              <a:rPr lang="en-SG" dirty="0"/>
+              <a:t>Stores data in-memory</a:t>
+            </a:r>
+          </a:p>
+          <a:p>
+            <a:endParaRPr lang="en-SG" dirty="0"/>
+          </a:p>
+          <a:p>
+            <a:r>
+              <a:rPr lang="en-SG" dirty="0"/>
+              <a:t>Historical Database (HDB)</a:t>
+            </a:r>
+          </a:p>
+          <a:p>
+            <a:pPr lvl="1"/>
+            <a:r>
+              <a:rPr lang="en-SG" dirty="0"/>
+              <a:t>Reads historical data files from partitions</a:t>
+            </a:r>
+          </a:p>
+          <a:p>
+            <a:pPr lvl="1"/>
+            <a:r>
+              <a:rPr lang="en-SG" dirty="0"/>
+              <a:t>Directory contains </a:t>
+            </a:r>
+            <a:r>
+              <a:rPr lang="en-SG" dirty="0" err="1"/>
+              <a:t>sym</a:t>
+            </a:r>
+            <a:r>
+              <a:rPr lang="en-SG" dirty="0"/>
+              <a:t> file and option par.txt</a:t>
+            </a:r>
+          </a:p>
+          <a:p>
+            <a:endParaRPr lang="en-SG" dirty="0"/>
+          </a:p>
+          <a:p>
+            <a:r>
+              <a:rPr lang="en-SG" dirty="0"/>
+              <a:t>Chain </a:t>
+            </a:r>
+            <a:r>
+              <a:rPr lang="en-SG" dirty="0" err="1"/>
+              <a:t>Tickerplant</a:t>
+            </a:r>
+            <a:r>
+              <a:rPr lang="en-SG" dirty="0"/>
+              <a:t> (CTP)</a:t>
+            </a:r>
+          </a:p>
+          <a:p>
+            <a:pPr lvl="1"/>
+            <a:r>
+              <a:rPr lang="en-SG" dirty="0"/>
+              <a:t>Same as TP but likely to have logic scope subscriptions</a:t>
+            </a:r>
+          </a:p>
+          <a:p>
+            <a:endParaRPr lang="en-SG" dirty="0"/>
+          </a:p>
+          <a:p>
+            <a:endParaRPr lang="en-SG" dirty="0"/>
+          </a:p>
+        </p:txBody>
+      </p:sp>
+      <p:sp>
+        <p:nvSpPr>
+          <p:cNvPr id="5" name="Slide Number Placeholder 4">
+            <a:extLst>
+              <a:ext uri="{FF2B5EF4-FFF2-40B4-BE49-F238E27FC236}">
+                <a16:creationId xmlns:a16="http://schemas.microsoft.com/office/drawing/2014/main" id="{989F8A9F-0029-4B68-879C-B430FA600199}"/>
+              </a:ext>
+            </a:extLst>
+          </p:cNvPr>
+          <p:cNvSpPr>
+            <a:spLocks noGrp="1"/>
+          </p:cNvSpPr>
+          <p:nvPr>
+            <p:ph type="sldNum" sz="quarter" idx="11"/>
+          </p:nvPr>
+        </p:nvSpPr>
+        <p:spPr/>
+        <p:txBody>
+          <a:bodyPr/>
+          <a:lstStyle/>
+          <a:p>
+            <a:fld id="{5435ED1D-9C82-406C-A555-58E463570241}" type="slidenum">
+              <a:rPr lang="en-GB" smtClean="0"/>
+              <a:pPr/>
+              <a:t>53</a:t>
+            </a:fld>
+            <a:endParaRPr lang="en-GB"/>
+          </a:p>
+        </p:txBody>
+      </p:sp>
+      <p:pic>
+        <p:nvPicPr>
+          <p:cNvPr id="6" name="Picture 5">
+            <a:extLst>
+              <a:ext uri="{FF2B5EF4-FFF2-40B4-BE49-F238E27FC236}">
+                <a16:creationId xmlns:a16="http://schemas.microsoft.com/office/drawing/2014/main" id="{0BD6CA84-4FCD-425F-BE40-B296E5040581}"/>
+              </a:ext>
+            </a:extLst>
+          </p:cNvPr>
+          <p:cNvPicPr>
+            <a:picLocks noChangeAspect="1"/>
+          </p:cNvPicPr>
+          <p:nvPr/>
+        </p:nvPicPr>
+        <p:blipFill>
+          <a:blip r:embed="rId2"/>
+          <a:stretch>
+            <a:fillRect/>
+          </a:stretch>
+        </p:blipFill>
+        <p:spPr>
+          <a:xfrm>
+            <a:off x="7061388" y="1041245"/>
+            <a:ext cx="2392174" cy="5017731"/>
+          </a:xfrm>
+          <a:prstGeom prst="rect">
+            <a:avLst/>
+          </a:prstGeom>
+        </p:spPr>
+      </p:pic>
+    </p:spTree>
+    <p:extLst>
+      <p:ext uri="{BB962C8B-B14F-4D97-AF65-F5344CB8AC3E}">
+        <p14:creationId xmlns:p14="http://schemas.microsoft.com/office/powerpoint/2010/main" val="305061808"/>
+      </p:ext>
+    </p:extLst>
+  </p:cSld>
+  <p:clrMapOvr>
+    <a:masterClrMapping/>
+  </p:clrMapOvr>
+</p:sld>
+</file>
+
+<file path=ppt/slides/slide54.xml><?xml version="1.0" encoding="utf-8"?>
+<p:sld xmlns:a="http://schemas.openxmlformats.org/drawingml/2006/main" xmlns:r="http://schemas.openxmlformats.org/officeDocument/2006/relationships" xmlns:p="http://schemas.openxmlformats.org/presentationml/2006/main">
+  <p:cSld>
+    <p:spTree>
+      <p:nvGrpSpPr>
+        <p:cNvPr id="1" name=""/>
+        <p:cNvGrpSpPr/>
+        <p:nvPr/>
+      </p:nvGrpSpPr>
+      <p:grpSpPr>
+        <a:xfrm>
+          <a:off x="0" y="0"/>
+          <a:ext cx="0" cy="0"/>
+          <a:chOff x="0" y="0"/>
+          <a:chExt cx="0" cy="0"/>
+        </a:xfrm>
+      </p:grpSpPr>
+      <p:sp>
+        <p:nvSpPr>
           <p:cNvPr id="5" name="Title 4">
             <a:extLst>
               <a:ext uri="{FF2B5EF4-FFF2-40B4-BE49-F238E27FC236}">
@@ -18940,7 +19296,7 @@
             <a:fld id="{5435ED1D-9C82-406C-A555-58E463570241}" type="slidenum">
               <a:rPr lang="en-GB" smtClean="0"/>
               <a:pPr/>
-              <a:t>53</a:t>
+              <a:t>54</a:t>
             </a:fld>
             <a:endParaRPr lang="en-GB"/>
           </a:p>
@@ -18959,7 +19315,7 @@
 </p:sld>
 </file>
 
-<file path=ppt/slides/slide54.xml><?xml version="1.0" encoding="utf-8"?>
+<file path=ppt/slides/slide55.xml><?xml version="1.0" encoding="utf-8"?>
 <p:sld xmlns:a="http://schemas.openxmlformats.org/drawingml/2006/main" xmlns:r="http://schemas.openxmlformats.org/officeDocument/2006/relationships" xmlns:p="http://schemas.openxmlformats.org/presentationml/2006/main">
   <p:cSld>
     <p:spTree>
@@ -19147,7 +19503,7 @@
             <a:fld id="{5435ED1D-9C82-406C-A555-58E463570241}" type="slidenum">
               <a:rPr lang="en-GB" smtClean="0"/>
               <a:pPr/>
-              <a:t>54</a:t>
+              <a:t>55</a:t>
             </a:fld>
             <a:endParaRPr lang="en-GB"/>
           </a:p>
@@ -19209,7 +19565,7 @@
 </p:sld>
 </file>
 
-<file path=ppt/slides/slide55.xml><?xml version="1.0" encoding="utf-8"?>
+<file path=ppt/slides/slide56.xml><?xml version="1.0" encoding="utf-8"?>
 <p:sld xmlns:a="http://schemas.openxmlformats.org/drawingml/2006/main" xmlns:r="http://schemas.openxmlformats.org/officeDocument/2006/relationships" xmlns:p="http://schemas.openxmlformats.org/presentationml/2006/main">
   <p:cSld>
     <p:spTree>
@@ -19377,7 +19733,7 @@
             <a:fld id="{5435ED1D-9C82-406C-A555-58E463570241}" type="slidenum">
               <a:rPr lang="en-GB" smtClean="0"/>
               <a:pPr/>
-              <a:t>55</a:t>
+              <a:t>56</a:t>
             </a:fld>
             <a:endParaRPr lang="en-GB"/>
           </a:p>

</xml_diff>